<commit_message>
updated some typos corrected
git-svn-id: https://160.78.46.112/svn/fsda.code.000/FSDA/trunk@1160 336e6153-a435-9040-aa94-c6aba0fb517b
</commit_message>
<xml_diff>
--- a/utilities_help/FlowChart.pptx
+++ b/utilities_help/FlowChart.pptx
@@ -141,6 +141,11 @@
             <a:srgbClr val="A4A3A4"/>
           </p15:clr>
         </p15:guide>
+        <p15:guide id="2" pos="2160">
+          <p15:clr>
+            <a:srgbClr val="A4A3A4"/>
+          </p15:clr>
+        </p15:guide>
       </p15:sldGuideLst>
     </p:ext>
   </p:extLst>
@@ -278,7 +283,7 @@
           <a:p>
             <a:fld id="{A60568F7-DEA3-421D-BEA9-5A2A5BF9A649}" type="datetimeFigureOut">
               <a:rPr lang="it-IT" smtClean="0"/>
-              <a:t>03/10/2016</a:t>
+              <a:t>04/10/2016</a:t>
             </a:fld>
             <a:endParaRPr lang="it-IT"/>
           </a:p>
@@ -448,7 +453,7 @@
           <a:p>
             <a:fld id="{A60568F7-DEA3-421D-BEA9-5A2A5BF9A649}" type="datetimeFigureOut">
               <a:rPr lang="it-IT" smtClean="0"/>
-              <a:t>03/10/2016</a:t>
+              <a:t>04/10/2016</a:t>
             </a:fld>
             <a:endParaRPr lang="it-IT"/>
           </a:p>
@@ -628,7 +633,7 @@
           <a:p>
             <a:fld id="{A60568F7-DEA3-421D-BEA9-5A2A5BF9A649}" type="datetimeFigureOut">
               <a:rPr lang="it-IT" smtClean="0"/>
-              <a:t>03/10/2016</a:t>
+              <a:t>04/10/2016</a:t>
             </a:fld>
             <a:endParaRPr lang="it-IT"/>
           </a:p>
@@ -798,7 +803,7 @@
           <a:p>
             <a:fld id="{A60568F7-DEA3-421D-BEA9-5A2A5BF9A649}" type="datetimeFigureOut">
               <a:rPr lang="it-IT" smtClean="0"/>
-              <a:t>03/10/2016</a:t>
+              <a:t>04/10/2016</a:t>
             </a:fld>
             <a:endParaRPr lang="it-IT"/>
           </a:p>
@@ -1042,7 +1047,7 @@
           <a:p>
             <a:fld id="{A60568F7-DEA3-421D-BEA9-5A2A5BF9A649}" type="datetimeFigureOut">
               <a:rPr lang="it-IT" smtClean="0"/>
-              <a:t>03/10/2016</a:t>
+              <a:t>04/10/2016</a:t>
             </a:fld>
             <a:endParaRPr lang="it-IT"/>
           </a:p>
@@ -1274,7 +1279,7 @@
           <a:p>
             <a:fld id="{A60568F7-DEA3-421D-BEA9-5A2A5BF9A649}" type="datetimeFigureOut">
               <a:rPr lang="it-IT" smtClean="0"/>
-              <a:t>03/10/2016</a:t>
+              <a:t>04/10/2016</a:t>
             </a:fld>
             <a:endParaRPr lang="it-IT"/>
           </a:p>
@@ -1641,7 +1646,7 @@
           <a:p>
             <a:fld id="{A60568F7-DEA3-421D-BEA9-5A2A5BF9A649}" type="datetimeFigureOut">
               <a:rPr lang="it-IT" smtClean="0"/>
-              <a:t>03/10/2016</a:t>
+              <a:t>04/10/2016</a:t>
             </a:fld>
             <a:endParaRPr lang="it-IT"/>
           </a:p>
@@ -1759,7 +1764,7 @@
           <a:p>
             <a:fld id="{A60568F7-DEA3-421D-BEA9-5A2A5BF9A649}" type="datetimeFigureOut">
               <a:rPr lang="it-IT" smtClean="0"/>
-              <a:t>03/10/2016</a:t>
+              <a:t>04/10/2016</a:t>
             </a:fld>
             <a:endParaRPr lang="it-IT"/>
           </a:p>
@@ -1854,7 +1859,7 @@
           <a:p>
             <a:fld id="{A60568F7-DEA3-421D-BEA9-5A2A5BF9A649}" type="datetimeFigureOut">
               <a:rPr lang="it-IT" smtClean="0"/>
-              <a:t>03/10/2016</a:t>
+              <a:t>04/10/2016</a:t>
             </a:fld>
             <a:endParaRPr lang="it-IT"/>
           </a:p>
@@ -2131,7 +2136,7 @@
           <a:p>
             <a:fld id="{A60568F7-DEA3-421D-BEA9-5A2A5BF9A649}" type="datetimeFigureOut">
               <a:rPr lang="it-IT" smtClean="0"/>
-              <a:t>03/10/2016</a:t>
+              <a:t>04/10/2016</a:t>
             </a:fld>
             <a:endParaRPr lang="it-IT"/>
           </a:p>
@@ -2388,7 +2393,7 @@
           <a:p>
             <a:fld id="{A60568F7-DEA3-421D-BEA9-5A2A5BF9A649}" type="datetimeFigureOut">
               <a:rPr lang="it-IT" smtClean="0"/>
-              <a:t>03/10/2016</a:t>
+              <a:t>04/10/2016</a:t>
             </a:fld>
             <a:endParaRPr lang="it-IT"/>
           </a:p>
@@ -2601,7 +2606,7 @@
           <a:p>
             <a:fld id="{A60568F7-DEA3-421D-BEA9-5A2A5BF9A649}" type="datetimeFigureOut">
               <a:rPr lang="it-IT" smtClean="0"/>
-              <a:t>03/10/2016</a:t>
+              <a:t>04/10/2016</a:t>
             </a:fld>
             <a:endParaRPr lang="it-IT"/>
           </a:p>
@@ -4513,8 +4518,8 @@
         </p:nvSpPr>
         <p:spPr>
           <a:xfrm>
-            <a:off x="471489" y="2434167"/>
-            <a:ext cx="5915025" cy="5801784"/>
+            <a:off x="109963" y="2434167"/>
+            <a:ext cx="6638078" cy="5801784"/>
           </a:xfrm>
         </p:spPr>
         <p:txBody>
@@ -5308,7 +5313,7 @@
         </p:spPr>
         <p:txBody>
           <a:bodyPr>
-            <a:normAutofit/>
+            <a:normAutofit fontScale="90000"/>
           </a:bodyPr>
           <a:lstStyle/>
           <a:p>
@@ -5318,7 +5323,11 @@
             </a:r>
             <a:r>
               <a:rPr lang="it-IT" dirty="0" smtClean="0"/>
-              <a:t> a </a:t>
+              <a:t> </a:t>
+            </a:r>
+            <a:r>
+              <a:rPr lang="it-IT" dirty="0" smtClean="0"/>
+              <a:t>of a </a:t>
             </a:r>
             <a:r>
               <a:rPr lang="it-IT" dirty="0" err="1" smtClean="0"/>
@@ -5377,8 +5386,16 @@
               <a:t> </a:t>
             </a:r>
             <a:r>
-              <a:rPr lang="it-IT" sz="3200" dirty="0" err="1"/>
+              <a:rPr lang="it-IT" dirty="0" smtClean="0"/>
+              <a:t>«</a:t>
+            </a:r>
+            <a:r>
+              <a:rPr lang="it-IT" sz="3200" dirty="0" err="1" smtClean="0"/>
               <a:t>removeextraspacesLF.m</a:t>
+            </a:r>
+            <a:r>
+              <a:rPr lang="it-IT" sz="3200" dirty="0" smtClean="0"/>
+              <a:t>»</a:t>
             </a:r>
             <a:endParaRPr lang="it-IT" dirty="0"/>
           </a:p>
@@ -5784,12 +5801,8 @@
           </a:p>
           <a:p>
             <a:r>
-              <a:rPr lang="it-IT" dirty="0" err="1" smtClean="0"/>
-              <a:t>REMARKs</a:t>
-            </a:r>
-            <a:r>
-              <a:rPr lang="it-IT" dirty="0" smtClean="0"/>
-              <a:t>: </a:t>
+              <a:rPr lang="it-IT" dirty="0" smtClean="0"/>
+              <a:t>REMARK: </a:t>
             </a:r>
             <a:r>
               <a:rPr lang="it-IT" dirty="0"/>
@@ -6088,8 +6101,16 @@
               <a:t>File </a:t>
             </a:r>
             <a:r>
+              <a:rPr lang="it-IT" dirty="0" smtClean="0"/>
+              <a:t>«</a:t>
+            </a:r>
+            <a:r>
               <a:rPr lang="it-IT" dirty="0" err="1" smtClean="0"/>
               <a:t>xmlreadFS.m</a:t>
+            </a:r>
+            <a:r>
+              <a:rPr lang="it-IT" dirty="0" smtClean="0"/>
+              <a:t>»</a:t>
             </a:r>
             <a:endParaRPr lang="it-IT" dirty="0"/>
           </a:p>
@@ -8500,7 +8521,7 @@
         </p:blipFill>
         <p:spPr>
           <a:xfrm>
-            <a:off x="0" y="1466581"/>
+            <a:off x="0" y="1640202"/>
             <a:ext cx="6919560" cy="6210838"/>
           </a:xfrm>
           <a:prstGeom prst="rect">
@@ -8724,7 +8745,11 @@
             </a:r>
             <a:r>
               <a:rPr lang="it-IT" dirty="0" smtClean="0"/>
-              <a:t> to XML </a:t>
+              <a:t> to </a:t>
+            </a:r>
+            <a:r>
+              <a:rPr lang="it-IT" dirty="0" smtClean="0"/>
+              <a:t>XML» </a:t>
             </a:r>
             <a:r>
               <a:rPr lang="it-IT" dirty="0" err="1" smtClean="0"/>
@@ -9173,11 +9198,7 @@
             </a:r>
             <a:r>
               <a:rPr lang="en-US" dirty="0"/>
-              <a:t>This </a:t>
-            </a:r>
-            <a:r>
-              <a:rPr lang="en-US" dirty="0"/>
-              <a:t>function not only does text wrapping, but also enables us:</a:t>
+              <a:t>This function not only does text wrapping, but also enables us:</a:t>
             </a:r>
           </a:p>
           <a:p>
@@ -14297,15 +14318,7 @@
           <a:p>
             <a:r>
               <a:rPr lang="it-IT" b="1" dirty="0" err="1"/>
-              <a:t>o</a:t>
-            </a:r>
-            <a:r>
-              <a:rPr lang="it-IT" b="1" dirty="0" err="1"/>
-              <a:t>ut.d</a:t>
-            </a:r>
-            <a:r>
-              <a:rPr lang="it-IT" b="1" dirty="0" err="1"/>
-              <a:t>escription</a:t>
+              <a:t>out.description</a:t>
             </a:r>
             <a:r>
               <a:rPr lang="it-IT" dirty="0" smtClean="0"/>
@@ -14421,7 +14434,236 @@
           <a:p>
             <a:r>
               <a:rPr lang="it-IT" b="1" dirty="0" err="1"/>
-              <a:t>out.OutArgs:</a:t>
+              <a:t>out.OutArgs</a:t>
+            </a:r>
+            <a:r>
+              <a:rPr lang="it-IT" b="1" dirty="0" smtClean="0"/>
+              <a:t>: </a:t>
+            </a:r>
+            <a:r>
+              <a:rPr lang="it-IT" dirty="0" err="1" smtClean="0"/>
+              <a:t>cell</a:t>
+            </a:r>
+            <a:r>
+              <a:rPr lang="it-IT" dirty="0" smtClean="0"/>
+              <a:t> </a:t>
+            </a:r>
+            <a:r>
+              <a:rPr lang="it-IT" dirty="0"/>
+              <a:t>of </a:t>
+            </a:r>
+            <a:r>
+              <a:rPr lang="it-IT" dirty="0" err="1"/>
+              <a:t>size</a:t>
+            </a:r>
+            <a:r>
+              <a:rPr lang="it-IT" dirty="0"/>
+              <a:t> d</a:t>
+            </a:r>
+            <a:r>
+              <a:rPr lang="it-IT" dirty="0" smtClean="0"/>
+              <a:t>×8 </a:t>
+            </a:r>
+            <a:r>
+              <a:rPr lang="it-IT" dirty="0"/>
+              <a:t>with </a:t>
+            </a:r>
+            <a:r>
+              <a:rPr lang="it-IT" dirty="0" smtClean="0"/>
+              <a:t>«Output </a:t>
+            </a:r>
+            <a:r>
+              <a:rPr lang="it-IT" dirty="0" err="1" smtClean="0"/>
+              <a:t>Arguments</a:t>
+            </a:r>
+            <a:r>
+              <a:rPr lang="it-IT" dirty="0"/>
+              <a:t>» </a:t>
+            </a:r>
+          </a:p>
+          <a:p>
+            <a:r>
+              <a:rPr lang="it-IT" b="1" dirty="0" err="1"/>
+              <a:t>out.MoreAbout</a:t>
+            </a:r>
+            <a:r>
+              <a:rPr lang="it-IT" dirty="0" smtClean="0"/>
+              <a:t>: </a:t>
+            </a:r>
+            <a:r>
+              <a:rPr lang="it-IT" dirty="0" err="1" smtClean="0"/>
+              <a:t>string</a:t>
+            </a:r>
+            <a:r>
+              <a:rPr lang="it-IT" dirty="0" smtClean="0"/>
+              <a:t> with </a:t>
+            </a:r>
+            <a:r>
+              <a:rPr lang="it-IT" dirty="0" err="1" smtClean="0"/>
+              <a:t>additional</a:t>
+            </a:r>
+            <a:r>
+              <a:rPr lang="it-IT" dirty="0" smtClean="0"/>
+              <a:t> </a:t>
+            </a:r>
+            <a:r>
+              <a:rPr lang="it-IT" dirty="0" err="1" smtClean="0"/>
+              <a:t>theoretical</a:t>
+            </a:r>
+            <a:r>
+              <a:rPr lang="it-IT" dirty="0" smtClean="0"/>
+              <a:t> </a:t>
+            </a:r>
+            <a:r>
+              <a:rPr lang="it-IT" dirty="0" err="1" smtClean="0"/>
+              <a:t>details</a:t>
+            </a:r>
+            <a:endParaRPr lang="it-IT" dirty="0" smtClean="0"/>
+          </a:p>
+          <a:p>
+            <a:r>
+              <a:rPr lang="it-IT" b="1" dirty="0" err="1"/>
+              <a:t>out.Acknowledgements</a:t>
+            </a:r>
+            <a:r>
+              <a:rPr lang="it-IT" dirty="0" smtClean="0"/>
+              <a:t>: </a:t>
+            </a:r>
+            <a:r>
+              <a:rPr lang="it-IT" dirty="0" err="1" smtClean="0"/>
+              <a:t>string</a:t>
+            </a:r>
+            <a:r>
+              <a:rPr lang="it-IT" dirty="0" smtClean="0"/>
+              <a:t> with </a:t>
+            </a:r>
+            <a:r>
+              <a:rPr lang="it-IT" dirty="0" err="1" smtClean="0"/>
+              <a:t>acknowledgements</a:t>
+            </a:r>
+            <a:endParaRPr lang="it-IT" dirty="0" smtClean="0"/>
+          </a:p>
+          <a:p>
+            <a:r>
+              <a:rPr lang="it-IT" b="1" dirty="0" err="1"/>
+              <a:t>out.References</a:t>
+            </a:r>
+            <a:r>
+              <a:rPr lang="it-IT" b="1" dirty="0"/>
+              <a:t>: </a:t>
+            </a:r>
+            <a:r>
+              <a:rPr lang="it-IT" dirty="0" err="1" smtClean="0"/>
+              <a:t>cell</a:t>
+            </a:r>
+            <a:r>
+              <a:rPr lang="it-IT" dirty="0" smtClean="0"/>
+              <a:t> of </a:t>
+            </a:r>
+            <a:r>
+              <a:rPr lang="it-IT" dirty="0" err="1" smtClean="0"/>
+              <a:t>size</a:t>
+            </a:r>
+            <a:r>
+              <a:rPr lang="it-IT" dirty="0" smtClean="0"/>
+              <a:t> f×1 with the </a:t>
+            </a:r>
+            <a:r>
+              <a:rPr lang="it-IT" dirty="0" err="1" smtClean="0"/>
+              <a:t>references</a:t>
+            </a:r>
+            <a:endParaRPr lang="it-IT" dirty="0" smtClean="0"/>
+          </a:p>
+          <a:p>
+            <a:r>
+              <a:rPr lang="it-IT" b="1" dirty="0" err="1"/>
+              <a:t>out.SeeAlso</a:t>
+            </a:r>
+            <a:r>
+              <a:rPr lang="it-IT" b="1" dirty="0"/>
+              <a:t>:</a:t>
+            </a:r>
+            <a:r>
+              <a:rPr lang="it-IT" dirty="0" smtClean="0"/>
+              <a:t> </a:t>
+            </a:r>
+            <a:r>
+              <a:rPr lang="it-IT" dirty="0" err="1" smtClean="0"/>
+              <a:t>cell</a:t>
+            </a:r>
+            <a:r>
+              <a:rPr lang="it-IT" dirty="0" smtClean="0"/>
+              <a:t> of </a:t>
+            </a:r>
+            <a:r>
+              <a:rPr lang="it-IT" dirty="0" err="1" smtClean="0"/>
+              <a:t>size</a:t>
+            </a:r>
+            <a:r>
+              <a:rPr lang="it-IT" dirty="0" smtClean="0"/>
+              <a:t> gx1 with </a:t>
+            </a:r>
+            <a:r>
+              <a:rPr lang="it-IT" dirty="0" err="1" smtClean="0"/>
+              <a:t>connected</a:t>
+            </a:r>
+            <a:r>
+              <a:rPr lang="it-IT" dirty="0" smtClean="0"/>
+              <a:t> MATLAB </a:t>
+            </a:r>
+            <a:r>
+              <a:rPr lang="it-IT" dirty="0" err="1" smtClean="0"/>
+              <a:t>files</a:t>
+            </a:r>
+            <a:endParaRPr lang="it-IT" dirty="0" smtClean="0"/>
+          </a:p>
+          <a:p>
+            <a:r>
+              <a:rPr lang="it-IT" b="1" dirty="0" err="1"/>
+              <a:t>out.Ex</a:t>
+            </a:r>
+            <a:r>
+              <a:rPr lang="it-IT" dirty="0" smtClean="0"/>
+              <a:t>: </a:t>
+            </a:r>
+            <a:r>
+              <a:rPr lang="it-IT" dirty="0" err="1" smtClean="0"/>
+              <a:t>cell</a:t>
+            </a:r>
+            <a:r>
+              <a:rPr lang="it-IT" dirty="0" smtClean="0"/>
+              <a:t> of </a:t>
+            </a:r>
+            <a:r>
+              <a:rPr lang="it-IT" dirty="0" err="1" smtClean="0"/>
+              <a:t>size</a:t>
+            </a:r>
+            <a:r>
+              <a:rPr lang="it-IT" dirty="0" smtClean="0"/>
+              <a:t> hx1 with </a:t>
+            </a:r>
+            <a:r>
+              <a:rPr lang="it-IT" dirty="0" err="1" smtClean="0"/>
+              <a:t>Examples</a:t>
+            </a:r>
+            <a:r>
+              <a:rPr lang="it-IT" dirty="0" smtClean="0"/>
+              <a:t> </a:t>
+            </a:r>
+            <a:endParaRPr lang="it-IT" dirty="0"/>
+          </a:p>
+          <a:p>
+            <a:r>
+              <a:rPr lang="it-IT" b="1" dirty="0" err="1"/>
+              <a:t>out.ExtraEx</a:t>
+            </a:r>
+            <a:r>
+              <a:rPr lang="it-IT" b="1" dirty="0"/>
+              <a:t>:</a:t>
+            </a:r>
+            <a:r>
+              <a:rPr lang="it-IT" dirty="0" smtClean="0"/>
+              <a:t> </a:t>
             </a:r>
             <a:r>
               <a:rPr lang="it-IT" dirty="0" err="1"/>
@@ -14437,11 +14679,11 @@
             </a:r>
             <a:r>
               <a:rPr lang="it-IT" dirty="0"/>
-              <a:t> d</a:t>
-            </a:r>
-            <a:r>
-              <a:rPr lang="it-IT" dirty="0" smtClean="0"/>
-              <a:t>×8 </a:t>
+              <a:t> </a:t>
+            </a:r>
+            <a:r>
+              <a:rPr lang="it-IT" dirty="0" smtClean="0"/>
+              <a:t>lx1 </a:t>
             </a:r>
             <a:r>
               <a:rPr lang="it-IT" dirty="0"/>
@@ -14449,21 +14691,22 @@
             </a:r>
             <a:r>
               <a:rPr lang="it-IT" dirty="0" smtClean="0"/>
-              <a:t>«Output </a:t>
-            </a:r>
-            <a:r>
-              <a:rPr lang="it-IT" dirty="0" err="1" smtClean="0"/>
-              <a:t>Arguments</a:t>
-            </a:r>
-            <a:r>
-              <a:rPr lang="it-IT" dirty="0"/>
-              <a:t>» </a:t>
-            </a:r>
-          </a:p>
-          <a:p>
+              <a:t>Extra </a:t>
+            </a:r>
+            <a:r>
+              <a:rPr lang="it-IT" dirty="0" err="1" smtClean="0"/>
+              <a:t>Examples</a:t>
+            </a:r>
+            <a:endParaRPr lang="it-IT" dirty="0" smtClean="0"/>
+          </a:p>
+          <a:p>
+            <a:r>
+              <a:rPr lang="it-IT" b="1" dirty="0"/>
+              <a:t>out. </a:t>
+            </a:r>
             <a:r>
               <a:rPr lang="it-IT" b="1" dirty="0" err="1"/>
-              <a:t>out.MoreAbout</a:t>
+              <a:t>InpArgsMisMatch</a:t>
             </a:r>
             <a:r>
               <a:rPr lang="it-IT" dirty="0" smtClean="0"/>
@@ -14471,15 +14714,7 @@
             </a:r>
             <a:r>
               <a:rPr lang="it-IT" dirty="0" err="1" smtClean="0"/>
-              <a:t>string</a:t>
-            </a:r>
-            <a:r>
-              <a:rPr lang="it-IT" dirty="0" smtClean="0"/>
-              <a:t> with </a:t>
-            </a:r>
-            <a:r>
-              <a:rPr lang="it-IT" dirty="0" err="1" smtClean="0"/>
-              <a:t>additional</a:t>
+              <a:t>eventual</a:t>
             </a:r>
             <a:r>
               <a:rPr lang="it-IT" dirty="0" smtClean="0"/>
@@ -14487,258 +14722,36 @@
             </a:r>
             <a:r>
               <a:rPr lang="it-IT" dirty="0" err="1" smtClean="0"/>
-              <a:t>theoretical</a:t>
-            </a:r>
-            <a:r>
-              <a:rPr lang="it-IT" dirty="0" smtClean="0"/>
-              <a:t> </a:t>
-            </a:r>
-            <a:r>
-              <a:rPr lang="it-IT" dirty="0" err="1" smtClean="0"/>
-              <a:t>details</a:t>
+              <a:t>mismatch</a:t>
+            </a:r>
+            <a:r>
+              <a:rPr lang="it-IT" dirty="0" smtClean="0"/>
+              <a:t> in </a:t>
+            </a:r>
+            <a:r>
+              <a:rPr lang="it-IT" dirty="0" err="1" smtClean="0"/>
+              <a:t>InpArgs</a:t>
             </a:r>
             <a:endParaRPr lang="it-IT" dirty="0" smtClean="0"/>
           </a:p>
           <a:p>
             <a:r>
               <a:rPr lang="it-IT" b="1" dirty="0" err="1"/>
-              <a:t>out.Acknowledgements</a:t>
+              <a:t>out.OutArgsStructMisMatch</a:t>
             </a:r>
             <a:r>
               <a:rPr lang="it-IT" dirty="0" smtClean="0"/>
               <a:t>: </a:t>
             </a:r>
             <a:r>
-              <a:rPr lang="it-IT" dirty="0" err="1" smtClean="0"/>
-              <a:t>string</a:t>
-            </a:r>
-            <a:r>
-              <a:rPr lang="it-IT" dirty="0" smtClean="0"/>
-              <a:t> with </a:t>
-            </a:r>
-            <a:r>
-              <a:rPr lang="it-IT" dirty="0" err="1" smtClean="0"/>
-              <a:t>acknowledgements</a:t>
-            </a:r>
-            <a:endParaRPr lang="it-IT" dirty="0" smtClean="0"/>
-          </a:p>
-          <a:p>
-            <a:r>
-              <a:rPr lang="it-IT" b="1" dirty="0" err="1"/>
-              <a:t>out.References</a:t>
-            </a:r>
-            <a:r>
-              <a:rPr lang="it-IT" b="1" dirty="0"/>
-              <a:t>: </a:t>
-            </a:r>
-            <a:r>
-              <a:rPr lang="it-IT" dirty="0" err="1" smtClean="0"/>
-              <a:t>cell</a:t>
-            </a:r>
-            <a:r>
-              <a:rPr lang="it-IT" dirty="0" smtClean="0"/>
-              <a:t> of </a:t>
-            </a:r>
-            <a:r>
-              <a:rPr lang="it-IT" dirty="0" err="1" smtClean="0"/>
-              <a:t>size</a:t>
-            </a:r>
-            <a:r>
-              <a:rPr lang="it-IT" dirty="0" smtClean="0"/>
-              <a:t> f×1 with the </a:t>
-            </a:r>
-            <a:r>
-              <a:rPr lang="it-IT" dirty="0" err="1" smtClean="0"/>
-              <a:t>references</a:t>
-            </a:r>
-            <a:endParaRPr lang="it-IT" dirty="0" smtClean="0"/>
-          </a:p>
-          <a:p>
-            <a:r>
-              <a:rPr lang="it-IT" b="1" dirty="0" err="1"/>
-              <a:t>out.SeeAlso</a:t>
-            </a:r>
-            <a:r>
-              <a:rPr lang="it-IT" b="1" dirty="0"/>
-              <a:t>:</a:t>
-            </a:r>
-            <a:r>
-              <a:rPr lang="it-IT" dirty="0" smtClean="0"/>
-              <a:t> </a:t>
-            </a:r>
-            <a:r>
-              <a:rPr lang="it-IT" dirty="0" err="1" smtClean="0"/>
-              <a:t>cell</a:t>
-            </a:r>
-            <a:r>
-              <a:rPr lang="it-IT" dirty="0" smtClean="0"/>
-              <a:t> of </a:t>
-            </a:r>
-            <a:r>
-              <a:rPr lang="it-IT" dirty="0" err="1" smtClean="0"/>
-              <a:t>size</a:t>
-            </a:r>
-            <a:r>
-              <a:rPr lang="it-IT" dirty="0" smtClean="0"/>
-              <a:t> gx1 with </a:t>
-            </a:r>
-            <a:r>
-              <a:rPr lang="it-IT" dirty="0" err="1" smtClean="0"/>
-              <a:t>connected</a:t>
-            </a:r>
-            <a:r>
-              <a:rPr lang="it-IT" dirty="0" smtClean="0"/>
-              <a:t> MATLAB </a:t>
-            </a:r>
-            <a:r>
-              <a:rPr lang="it-IT" dirty="0" err="1" smtClean="0"/>
-              <a:t>files</a:t>
-            </a:r>
-            <a:endParaRPr lang="it-IT" dirty="0" smtClean="0"/>
-          </a:p>
-          <a:p>
-            <a:r>
-              <a:rPr lang="it-IT" b="1" dirty="0" err="1"/>
-              <a:t>o</a:t>
-            </a:r>
-            <a:r>
-              <a:rPr lang="it-IT" b="1" dirty="0" err="1"/>
-              <a:t>ut.Ex</a:t>
-            </a:r>
-            <a:r>
-              <a:rPr lang="it-IT" dirty="0" smtClean="0"/>
-              <a:t>: </a:t>
-            </a:r>
-            <a:r>
-              <a:rPr lang="it-IT" dirty="0" err="1" smtClean="0"/>
-              <a:t>cell</a:t>
-            </a:r>
-            <a:r>
-              <a:rPr lang="it-IT" dirty="0" smtClean="0"/>
-              <a:t> of </a:t>
-            </a:r>
-            <a:r>
-              <a:rPr lang="it-IT" dirty="0" err="1" smtClean="0"/>
-              <a:t>size</a:t>
-            </a:r>
-            <a:r>
-              <a:rPr lang="it-IT" dirty="0" smtClean="0"/>
-              <a:t> hx1 with </a:t>
-            </a:r>
-            <a:r>
-              <a:rPr lang="it-IT" dirty="0" err="1" smtClean="0"/>
-              <a:t>Examples</a:t>
-            </a:r>
-            <a:r>
-              <a:rPr lang="it-IT" dirty="0" smtClean="0"/>
-              <a:t> </a:t>
-            </a:r>
-            <a:endParaRPr lang="it-IT" dirty="0"/>
-          </a:p>
-          <a:p>
-            <a:r>
-              <a:rPr lang="it-IT" b="1" dirty="0" err="1"/>
-              <a:t>out.ExtraEx</a:t>
-            </a:r>
-            <a:r>
-              <a:rPr lang="it-IT" b="1" dirty="0"/>
-              <a:t>:</a:t>
-            </a:r>
-            <a:r>
-              <a:rPr lang="it-IT" dirty="0" smtClean="0"/>
-              <a:t> </a:t>
-            </a:r>
-            <a:r>
               <a:rPr lang="it-IT" dirty="0" err="1"/>
-              <a:t>cell</a:t>
-            </a:r>
-            <a:r>
-              <a:rPr lang="it-IT" dirty="0"/>
-              <a:t> of </a:t>
-            </a:r>
-            <a:r>
-              <a:rPr lang="it-IT" dirty="0" err="1"/>
-              <a:t>size</a:t>
+              <a:t>eventual</a:t>
             </a:r>
             <a:r>
               <a:rPr lang="it-IT" dirty="0"/>
               <a:t> </a:t>
             </a:r>
             <a:r>
-              <a:rPr lang="it-IT" dirty="0" smtClean="0"/>
-              <a:t>lx1 </a:t>
-            </a:r>
-            <a:r>
-              <a:rPr lang="it-IT" dirty="0"/>
-              <a:t>with </a:t>
-            </a:r>
-            <a:r>
-              <a:rPr lang="it-IT" dirty="0" smtClean="0"/>
-              <a:t>Extra </a:t>
-            </a:r>
-            <a:r>
-              <a:rPr lang="it-IT" dirty="0" err="1" smtClean="0"/>
-              <a:t>Examples</a:t>
-            </a:r>
-            <a:endParaRPr lang="it-IT" dirty="0" smtClean="0"/>
-          </a:p>
-          <a:p>
-            <a:r>
-              <a:rPr lang="it-IT" b="1" dirty="0"/>
-              <a:t>out</a:t>
-            </a:r>
-            <a:r>
-              <a:rPr lang="it-IT" b="1" dirty="0"/>
-              <a:t>. </a:t>
-            </a:r>
-            <a:r>
-              <a:rPr lang="it-IT" b="1" dirty="0" err="1"/>
-              <a:t>InpArgsMisMatch</a:t>
-            </a:r>
-            <a:r>
-              <a:rPr lang="it-IT" dirty="0" smtClean="0"/>
-              <a:t>: </a:t>
-            </a:r>
-            <a:r>
-              <a:rPr lang="it-IT" dirty="0" err="1" smtClean="0"/>
-              <a:t>eventual</a:t>
-            </a:r>
-            <a:r>
-              <a:rPr lang="it-IT" dirty="0" smtClean="0"/>
-              <a:t> </a:t>
-            </a:r>
-            <a:r>
-              <a:rPr lang="it-IT" dirty="0" err="1" smtClean="0"/>
-              <a:t>mismatch</a:t>
-            </a:r>
-            <a:r>
-              <a:rPr lang="it-IT" dirty="0" smtClean="0"/>
-              <a:t> in </a:t>
-            </a:r>
-            <a:r>
-              <a:rPr lang="it-IT" dirty="0" err="1" smtClean="0"/>
-              <a:t>InpArgs</a:t>
-            </a:r>
-            <a:endParaRPr lang="it-IT" dirty="0" smtClean="0"/>
-          </a:p>
-          <a:p>
-            <a:r>
-              <a:rPr lang="it-IT" b="1" dirty="0" err="1"/>
-              <a:t>out.OutArgsStructMisMatch</a:t>
-            </a:r>
-            <a:r>
-              <a:rPr lang="it-IT" dirty="0" smtClean="0"/>
-              <a:t>: </a:t>
-            </a:r>
-            <a:r>
-              <a:rPr lang="it-IT" dirty="0" err="1"/>
-              <a:t>eventual</a:t>
-            </a:r>
-            <a:r>
-              <a:rPr lang="it-IT" dirty="0"/>
-              <a:t> </a:t>
-            </a:r>
-            <a:r>
               <a:rPr lang="it-IT" dirty="0" err="1"/>
               <a:t>mismatch</a:t>
             </a:r>
@@ -14755,15 +14768,7 @@
           <a:p>
             <a:r>
               <a:rPr lang="it-IT" b="1" dirty="0" err="1"/>
-              <a:t>o</a:t>
-            </a:r>
-            <a:r>
-              <a:rPr lang="it-IT" b="1" dirty="0" err="1"/>
-              <a:t>ut.linkHTMLMisMatc</a:t>
-            </a:r>
-            <a:r>
-              <a:rPr lang="it-IT" b="1" dirty="0" err="1"/>
-              <a:t>h</a:t>
+              <a:t>out.linkHTMLMisMatch</a:t>
             </a:r>
             <a:r>
               <a:rPr lang="it-IT" dirty="0" smtClean="0"/>

</xml_diff>

<commit_message>
questo commit sarà da rincontrollare poiché non ho tenuto traccia delle ultime modifiche fatte
git-svn-id: https://160.78.46.112/svn/fsda.code.000/FSDA/trunk@1192 336e6153-a435-9040-aa94-c6aba0fb517b
</commit_message>
<xml_diff>
--- a/utilities_help/FlowChart.pptx
+++ b/utilities_help/FlowChart.pptx
@@ -283,7 +283,7 @@
           <a:p>
             <a:fld id="{A60568F7-DEA3-421D-BEA9-5A2A5BF9A649}" type="datetimeFigureOut">
               <a:rPr lang="it-IT" smtClean="0"/>
-              <a:t>04/10/2016</a:t>
+              <a:t>20/10/2016</a:t>
             </a:fld>
             <a:endParaRPr lang="it-IT"/>
           </a:p>
@@ -453,7 +453,7 @@
           <a:p>
             <a:fld id="{A60568F7-DEA3-421D-BEA9-5A2A5BF9A649}" type="datetimeFigureOut">
               <a:rPr lang="it-IT" smtClean="0"/>
-              <a:t>04/10/2016</a:t>
+              <a:t>20/10/2016</a:t>
             </a:fld>
             <a:endParaRPr lang="it-IT"/>
           </a:p>
@@ -633,7 +633,7 @@
           <a:p>
             <a:fld id="{A60568F7-DEA3-421D-BEA9-5A2A5BF9A649}" type="datetimeFigureOut">
               <a:rPr lang="it-IT" smtClean="0"/>
-              <a:t>04/10/2016</a:t>
+              <a:t>20/10/2016</a:t>
             </a:fld>
             <a:endParaRPr lang="it-IT"/>
           </a:p>
@@ -803,7 +803,7 @@
           <a:p>
             <a:fld id="{A60568F7-DEA3-421D-BEA9-5A2A5BF9A649}" type="datetimeFigureOut">
               <a:rPr lang="it-IT" smtClean="0"/>
-              <a:t>04/10/2016</a:t>
+              <a:t>20/10/2016</a:t>
             </a:fld>
             <a:endParaRPr lang="it-IT"/>
           </a:p>
@@ -1047,7 +1047,7 @@
           <a:p>
             <a:fld id="{A60568F7-DEA3-421D-BEA9-5A2A5BF9A649}" type="datetimeFigureOut">
               <a:rPr lang="it-IT" smtClean="0"/>
-              <a:t>04/10/2016</a:t>
+              <a:t>20/10/2016</a:t>
             </a:fld>
             <a:endParaRPr lang="it-IT"/>
           </a:p>
@@ -1279,7 +1279,7 @@
           <a:p>
             <a:fld id="{A60568F7-DEA3-421D-BEA9-5A2A5BF9A649}" type="datetimeFigureOut">
               <a:rPr lang="it-IT" smtClean="0"/>
-              <a:t>04/10/2016</a:t>
+              <a:t>20/10/2016</a:t>
             </a:fld>
             <a:endParaRPr lang="it-IT"/>
           </a:p>
@@ -1646,7 +1646,7 @@
           <a:p>
             <a:fld id="{A60568F7-DEA3-421D-BEA9-5A2A5BF9A649}" type="datetimeFigureOut">
               <a:rPr lang="it-IT" smtClean="0"/>
-              <a:t>04/10/2016</a:t>
+              <a:t>20/10/2016</a:t>
             </a:fld>
             <a:endParaRPr lang="it-IT"/>
           </a:p>
@@ -1764,7 +1764,7 @@
           <a:p>
             <a:fld id="{A60568F7-DEA3-421D-BEA9-5A2A5BF9A649}" type="datetimeFigureOut">
               <a:rPr lang="it-IT" smtClean="0"/>
-              <a:t>04/10/2016</a:t>
+              <a:t>20/10/2016</a:t>
             </a:fld>
             <a:endParaRPr lang="it-IT"/>
           </a:p>
@@ -1859,7 +1859,7 @@
           <a:p>
             <a:fld id="{A60568F7-DEA3-421D-BEA9-5A2A5BF9A649}" type="datetimeFigureOut">
               <a:rPr lang="it-IT" smtClean="0"/>
-              <a:t>04/10/2016</a:t>
+              <a:t>20/10/2016</a:t>
             </a:fld>
             <a:endParaRPr lang="it-IT"/>
           </a:p>
@@ -2136,7 +2136,7 @@
           <a:p>
             <a:fld id="{A60568F7-DEA3-421D-BEA9-5A2A5BF9A649}" type="datetimeFigureOut">
               <a:rPr lang="it-IT" smtClean="0"/>
-              <a:t>04/10/2016</a:t>
+              <a:t>20/10/2016</a:t>
             </a:fld>
             <a:endParaRPr lang="it-IT"/>
           </a:p>
@@ -2393,7 +2393,7 @@
           <a:p>
             <a:fld id="{A60568F7-DEA3-421D-BEA9-5A2A5BF9A649}" type="datetimeFigureOut">
               <a:rPr lang="it-IT" smtClean="0"/>
-              <a:t>04/10/2016</a:t>
+              <a:t>20/10/2016</a:t>
             </a:fld>
             <a:endParaRPr lang="it-IT"/>
           </a:p>
@@ -2606,7 +2606,7 @@
           <a:p>
             <a:fld id="{A60568F7-DEA3-421D-BEA9-5A2A5BF9A649}" type="datetimeFigureOut">
               <a:rPr lang="it-IT" smtClean="0"/>
-              <a:t>04/10/2016</a:t>
+              <a:t>20/10/2016</a:t>
             </a:fld>
             <a:endParaRPr lang="it-IT"/>
           </a:p>
@@ -4127,6 +4127,13 @@
   <p:clrMapOvr>
     <a:masterClrMapping/>
   </p:clrMapOvr>
+  <p:timing>
+    <p:tnLst>
+      <p:par>
+        <p:cTn id="1" dur="indefinite" restart="never" nodeType="tmRoot"/>
+      </p:par>
+    </p:tnLst>
+  </p:timing>
 </p:sld>
 </file>
 
@@ -4288,6 +4295,13 @@
   <p:clrMapOvr>
     <a:masterClrMapping/>
   </p:clrMapOvr>
+  <p:timing>
+    <p:tnLst>
+      <p:par>
+        <p:cTn id="1" dur="indefinite" restart="never" nodeType="tmRoot"/>
+      </p:par>
+    </p:tnLst>
+  </p:timing>
 </p:sld>
 </file>
 
@@ -4455,6 +4469,13 @@
   <p:clrMapOvr>
     <a:masterClrMapping/>
   </p:clrMapOvr>
+  <p:timing>
+    <p:tnLst>
+      <p:par>
+        <p:cTn id="1" dur="indefinite" restart="never" nodeType="tmRoot"/>
+      </p:par>
+    </p:tnLst>
+  </p:timing>
 </p:sld>
 </file>
 
@@ -5275,6 +5296,13 @@
   <p:clrMapOvr>
     <a:masterClrMapping/>
   </p:clrMapOvr>
+  <p:timing>
+    <p:tnLst>
+      <p:par>
+        <p:cTn id="1" dur="indefinite" restart="never" nodeType="tmRoot"/>
+      </p:par>
+    </p:tnLst>
+  </p:timing>
 </p:sld>
 </file>
 
@@ -5323,15 +5351,27 @@
             </a:r>
             <a:r>
               <a:rPr lang="it-IT" dirty="0" smtClean="0"/>
+              <a:t> of a </a:t>
+            </a:r>
+            <a:r>
+              <a:rPr lang="it-IT" dirty="0" err="1" smtClean="0"/>
+              <a:t>particular</a:t>
+            </a:r>
+            <a:r>
+              <a:rPr lang="it-IT" dirty="0" smtClean="0"/>
               <a:t> </a:t>
             </a:r>
             <a:r>
-              <a:rPr lang="it-IT" dirty="0" smtClean="0"/>
-              <a:t>of a </a:t>
-            </a:r>
-            <a:r>
-              <a:rPr lang="it-IT" dirty="0" err="1" smtClean="0"/>
-              <a:t>particular</a:t>
+              <a:rPr lang="it-IT" dirty="0" err="1" smtClean="0"/>
+              <a:t>element</a:t>
+            </a:r>
+            <a:r>
+              <a:rPr lang="it-IT" dirty="0" smtClean="0"/>
+              <a:t> inside </a:t>
+            </a:r>
+            <a:r>
+              <a:rPr lang="it-IT" dirty="0" err="1" smtClean="0"/>
+              <a:t>out.OptArgs</a:t>
             </a:r>
             <a:r>
               <a:rPr lang="it-IT" dirty="0" smtClean="0"/>
@@ -5339,15 +5379,15 @@
             </a:r>
             <a:r>
               <a:rPr lang="it-IT" dirty="0" err="1" smtClean="0"/>
-              <a:t>element</a:t>
-            </a:r>
-            <a:r>
-              <a:rPr lang="it-IT" dirty="0" smtClean="0"/>
-              <a:t> inside </a:t>
-            </a:r>
-            <a:r>
-              <a:rPr lang="it-IT" dirty="0" err="1" smtClean="0"/>
-              <a:t>out.OptArgs</a:t>
+              <a:t>before</a:t>
+            </a:r>
+            <a:r>
+              <a:rPr lang="it-IT" dirty="0" smtClean="0"/>
+              <a:t> and </a:t>
+            </a:r>
+            <a:r>
+              <a:rPr lang="it-IT" dirty="0" err="1" smtClean="0"/>
+              <a:t>after</a:t>
             </a:r>
             <a:r>
               <a:rPr lang="it-IT" dirty="0" smtClean="0"/>
@@ -5355,15 +5395,7 @@
             </a:r>
             <a:r>
               <a:rPr lang="it-IT" dirty="0" err="1" smtClean="0"/>
-              <a:t>before</a:t>
-            </a:r>
-            <a:r>
-              <a:rPr lang="it-IT" dirty="0" smtClean="0"/>
-              <a:t> and </a:t>
-            </a:r>
-            <a:r>
-              <a:rPr lang="it-IT" dirty="0" err="1" smtClean="0"/>
-              <a:t>after</a:t>
+              <a:t>applying</a:t>
             </a:r>
             <a:r>
               <a:rPr lang="it-IT" dirty="0" smtClean="0"/>
@@ -5371,23 +5403,11 @@
             </a:r>
             <a:r>
               <a:rPr lang="it-IT" dirty="0" err="1" smtClean="0"/>
-              <a:t>applying</a:t>
-            </a:r>
-            <a:r>
-              <a:rPr lang="it-IT" dirty="0" smtClean="0"/>
-              <a:t> </a:t>
-            </a:r>
-            <a:r>
-              <a:rPr lang="it-IT" dirty="0" err="1" smtClean="0"/>
               <a:t>function</a:t>
             </a:r>
             <a:r>
               <a:rPr lang="it-IT" dirty="0" smtClean="0"/>
-              <a:t> </a:t>
-            </a:r>
-            <a:r>
-              <a:rPr lang="it-IT" dirty="0" smtClean="0"/>
-              <a:t>«</a:t>
+              <a:t> «</a:t>
             </a:r>
             <a:r>
               <a:rPr lang="it-IT" sz="3200" dirty="0" err="1" smtClean="0"/>
@@ -5681,6 +5701,13 @@
   <p:clrMapOvr>
     <a:masterClrMapping/>
   </p:clrMapOvr>
+  <p:timing>
+    <p:tnLst>
+      <p:par>
+        <p:cTn id="1" dur="indefinite" restart="never" nodeType="tmRoot"/>
+      </p:par>
+    </p:tnLst>
+  </p:timing>
 </p:sld>
 </file>
 
@@ -6098,11 +6125,7 @@
           <a:p>
             <a:r>
               <a:rPr lang="it-IT" dirty="0" smtClean="0"/>
-              <a:t>File </a:t>
-            </a:r>
-            <a:r>
-              <a:rPr lang="it-IT" dirty="0" smtClean="0"/>
-              <a:t>«</a:t>
+              <a:t>File «</a:t>
             </a:r>
             <a:r>
               <a:rPr lang="it-IT" dirty="0" err="1" smtClean="0"/>
@@ -6474,6 +6497,13 @@
   <p:clrMapOvr>
     <a:masterClrMapping/>
   </p:clrMapOvr>
+  <p:timing>
+    <p:tnLst>
+      <p:par>
+        <p:cTn id="1" dur="indefinite" restart="never" nodeType="tmRoot"/>
+      </p:par>
+    </p:tnLst>
+  </p:timing>
 </p:sld>
 </file>
 
@@ -6787,6 +6817,13 @@
   <p:clrMapOvr>
     <a:masterClrMapping/>
   </p:clrMapOvr>
+  <p:timing>
+    <p:tnLst>
+      <p:par>
+        <p:cTn id="1" dur="indefinite" restart="never" nodeType="tmRoot"/>
+      </p:par>
+    </p:tnLst>
+  </p:timing>
 </p:sld>
 </file>
 
@@ -8233,6 +8270,13 @@
   <p:clrMapOvr>
     <a:masterClrMapping/>
   </p:clrMapOvr>
+  <p:timing>
+    <p:tnLst>
+      <p:par>
+        <p:cTn id="1" dur="indefinite" restart="never" nodeType="tmRoot"/>
+      </p:par>
+    </p:tnLst>
+  </p:timing>
 </p:sld>
 </file>
 
@@ -8335,6 +8379,13 @@
   <p:clrMapOvr>
     <a:masterClrMapping/>
   </p:clrMapOvr>
+  <p:timing>
+    <p:tnLst>
+      <p:par>
+        <p:cTn id="1" dur="indefinite" restart="never" nodeType="tmRoot"/>
+      </p:par>
+    </p:tnLst>
+  </p:timing>
 </p:sld>
 </file>
 
@@ -8437,6 +8488,13 @@
   <p:clrMapOvr>
     <a:masterClrMapping/>
   </p:clrMapOvr>
+  <p:timing>
+    <p:tnLst>
+      <p:par>
+        <p:cTn id="1" dur="indefinite" restart="never" nodeType="tmRoot"/>
+      </p:par>
+    </p:tnLst>
+  </p:timing>
 </p:sld>
 </file>
 
@@ -8539,6 +8597,13 @@
   <p:clrMapOvr>
     <a:masterClrMapping/>
   </p:clrMapOvr>
+  <p:timing>
+    <p:tnLst>
+      <p:par>
+        <p:cTn id="1" dur="indefinite" restart="never" nodeType="tmRoot"/>
+      </p:par>
+    </p:tnLst>
+  </p:timing>
 </p:sld>
 </file>
 
@@ -8675,6 +8740,13 @@
   <p:clrMapOvr>
     <a:masterClrMapping/>
   </p:clrMapOvr>
+  <p:timing>
+    <p:tnLst>
+      <p:par>
+        <p:cTn id="1" dur="indefinite" restart="never" nodeType="tmRoot"/>
+      </p:par>
+    </p:tnLst>
+  </p:timing>
 </p:sld>
 </file>
 
@@ -8745,11 +8817,7 @@
             </a:r>
             <a:r>
               <a:rPr lang="it-IT" dirty="0" smtClean="0"/>
-              <a:t> to </a:t>
-            </a:r>
-            <a:r>
-              <a:rPr lang="it-IT" dirty="0" smtClean="0"/>
-              <a:t>XML» </a:t>
+              <a:t> to XML» </a:t>
             </a:r>
             <a:r>
               <a:rPr lang="it-IT" dirty="0" err="1" smtClean="0"/>
@@ -9314,8 +9382,8 @@
         </p:nvSpPr>
         <p:spPr>
           <a:xfrm>
-            <a:off x="471487" y="89844"/>
-            <a:ext cx="5915025" cy="1345417"/>
+            <a:off x="92595" y="89844"/>
+            <a:ext cx="6293917" cy="1345417"/>
           </a:xfrm>
         </p:spPr>
         <p:txBody>
@@ -9342,7 +9410,7 @@
             </a:r>
             <a:r>
               <a:rPr lang="it-IT" dirty="0" err="1" smtClean="0"/>
-              <a:t>funtion</a:t>
+              <a:t>function</a:t>
             </a:r>
             <a:r>
               <a:rPr lang="it-IT" dirty="0" smtClean="0"/>

</xml_diff>